<commit_message>
Updated week 4 presentation
</commit_message>
<xml_diff>
--- a/Presentations/Week_4_Presentation.pptx
+++ b/Presentations/Week_4_Presentation.pptx
@@ -5,25 +5,26 @@
     <p:sldMasterId id="2147483648" r:id="rId4"/>
   </p:sldMasterIdLst>
   <p:notesMasterIdLst>
-    <p:notesMasterId r:id="rId18"/>
+    <p:notesMasterId r:id="rId19"/>
   </p:notesMasterIdLst>
   <p:handoutMasterIdLst>
-    <p:handoutMasterId r:id="rId19"/>
+    <p:handoutMasterId r:id="rId20"/>
   </p:handoutMasterIdLst>
   <p:sldIdLst>
     <p:sldId id="305" r:id="rId5"/>
     <p:sldId id="306" r:id="rId6"/>
     <p:sldId id="319" r:id="rId7"/>
     <p:sldId id="322" r:id="rId8"/>
-    <p:sldId id="333" r:id="rId9"/>
-    <p:sldId id="334" r:id="rId10"/>
-    <p:sldId id="335" r:id="rId11"/>
-    <p:sldId id="323" r:id="rId12"/>
-    <p:sldId id="336" r:id="rId13"/>
-    <p:sldId id="337" r:id="rId14"/>
-    <p:sldId id="331" r:id="rId15"/>
-    <p:sldId id="330" r:id="rId16"/>
-    <p:sldId id="318" r:id="rId17"/>
+    <p:sldId id="338" r:id="rId9"/>
+    <p:sldId id="333" r:id="rId10"/>
+    <p:sldId id="334" r:id="rId11"/>
+    <p:sldId id="335" r:id="rId12"/>
+    <p:sldId id="323" r:id="rId13"/>
+    <p:sldId id="336" r:id="rId14"/>
+    <p:sldId id="337" r:id="rId15"/>
+    <p:sldId id="331" r:id="rId16"/>
+    <p:sldId id="330" r:id="rId17"/>
+    <p:sldId id="318" r:id="rId18"/>
   </p:sldIdLst>
   <p:sldSz cx="12192000" cy="6858000"/>
   <p:notesSz cx="6858000" cy="9144000"/>
@@ -7562,6 +7563,172 @@
   <p:cSld>
     <p:spTree>
       <p:nvGrpSpPr>
+        <p:cNvPr id="1" name=""/>
+        <p:cNvGrpSpPr/>
+        <p:nvPr/>
+      </p:nvGrpSpPr>
+      <p:grpSpPr>
+        <a:xfrm>
+          <a:off x="0" y="0"/>
+          <a:ext cx="0" cy="0"/>
+          <a:chOff x="0" y="0"/>
+          <a:chExt cx="0" cy="0"/>
+        </a:xfrm>
+      </p:grpSpPr>
+      <p:sp>
+        <p:nvSpPr>
+          <p:cNvPr id="2" name="Title 1">
+            <a:extLst>
+              <a:ext uri="{FF2B5EF4-FFF2-40B4-BE49-F238E27FC236}">
+                <a16:creationId xmlns:a16="http://schemas.microsoft.com/office/drawing/2014/main" id="{F6960943-4213-471A-FB97-453EB2D92AD7}"/>
+              </a:ext>
+            </a:extLst>
+          </p:cNvPr>
+          <p:cNvSpPr>
+            <a:spLocks noGrp="1"/>
+          </p:cNvSpPr>
+          <p:nvPr>
+            <p:ph type="title"/>
+          </p:nvPr>
+        </p:nvSpPr>
+        <p:spPr/>
+        <p:txBody>
+          <a:bodyPr/>
+          <a:lstStyle/>
+          <a:p>
+            <a:r>
+              <a:rPr lang="en-US" dirty="0"/>
+              <a:t>High Voltage Rails</a:t>
+            </a:r>
+          </a:p>
+        </p:txBody>
+      </p:sp>
+      <p:sp>
+        <p:nvSpPr>
+          <p:cNvPr id="3" name="Content Placeholder 2">
+            <a:extLst>
+              <a:ext uri="{FF2B5EF4-FFF2-40B4-BE49-F238E27FC236}">
+                <a16:creationId xmlns:a16="http://schemas.microsoft.com/office/drawing/2014/main" id="{371E44E7-A863-F60C-AE9E-E991F455CA67}"/>
+              </a:ext>
+            </a:extLst>
+          </p:cNvPr>
+          <p:cNvSpPr>
+            <a:spLocks noGrp="1"/>
+          </p:cNvSpPr>
+          <p:nvPr>
+            <p:ph sz="quarter" idx="13"/>
+          </p:nvPr>
+        </p:nvSpPr>
+        <p:spPr>
+          <a:xfrm>
+            <a:off x="841248" y="1536827"/>
+            <a:ext cx="10533486" cy="4479925"/>
+          </a:xfrm>
+        </p:spPr>
+        <p:txBody>
+          <a:bodyPr/>
+          <a:lstStyle/>
+          <a:p>
+            <a:pPr marL="0" indent="0">
+              <a:buNone/>
+            </a:pPr>
+            <a:r>
+              <a:rPr lang="en-US" dirty="0"/>
+              <a:t>Need to drive to +/-30V with room for improvement.</a:t>
+            </a:r>
+          </a:p>
+          <a:p>
+            <a:r>
+              <a:rPr lang="en-US" dirty="0"/>
+              <a:t>Use boost converter</a:t>
+            </a:r>
+          </a:p>
+          <a:p>
+            <a:r>
+              <a:rPr lang="en-US" dirty="0"/>
+              <a:t>How do we minimize footprint?</a:t>
+            </a:r>
+          </a:p>
+        </p:txBody>
+      </p:sp>
+      <p:sp>
+        <p:nvSpPr>
+          <p:cNvPr id="4" name="Slide Number Placeholder 3">
+            <a:extLst>
+              <a:ext uri="{FF2B5EF4-FFF2-40B4-BE49-F238E27FC236}">
+                <a16:creationId xmlns:a16="http://schemas.microsoft.com/office/drawing/2014/main" id="{98EEA432-2056-CD7E-D9E3-D8592227B3E9}"/>
+              </a:ext>
+            </a:extLst>
+          </p:cNvPr>
+          <p:cNvSpPr>
+            <a:spLocks noGrp="1"/>
+          </p:cNvSpPr>
+          <p:nvPr>
+            <p:ph type="sldNum" sz="quarter" idx="11"/>
+          </p:nvPr>
+        </p:nvSpPr>
+        <p:spPr/>
+        <p:txBody>
+          <a:bodyPr/>
+          <a:lstStyle/>
+          <a:p>
+            <a:fld id="{B67B645E-C5E5-4727-B977-D372A0AA71D9}" type="slidenum">
+              <a:rPr lang="en-US" smtClean="0"/>
+              <a:pPr/>
+              <a:t>10</a:t>
+            </a:fld>
+            <a:endParaRPr lang="en-US" dirty="0"/>
+          </a:p>
+        </p:txBody>
+      </p:sp>
+      <p:pic>
+        <p:nvPicPr>
+          <p:cNvPr id="6" name="Picture 5" descr="A close-up of a circuit board&#10;&#10;AI-generated content may be incorrect.">
+            <a:extLst>
+              <a:ext uri="{FF2B5EF4-FFF2-40B4-BE49-F238E27FC236}">
+                <a16:creationId xmlns:a16="http://schemas.microsoft.com/office/drawing/2014/main" id="{39F3B60F-EED7-8641-369F-334B1F013986}"/>
+              </a:ext>
+            </a:extLst>
+          </p:cNvPr>
+          <p:cNvPicPr>
+            <a:picLocks noChangeAspect="1"/>
+          </p:cNvPicPr>
+          <p:nvPr/>
+        </p:nvPicPr>
+        <p:blipFill>
+          <a:blip r:embed="rId2"/>
+          <a:stretch>
+            <a:fillRect/>
+          </a:stretch>
+        </p:blipFill>
+        <p:spPr>
+          <a:xfrm>
+            <a:off x="7480998" y="2661509"/>
+            <a:ext cx="3651997" cy="3612937"/>
+          </a:xfrm>
+          <a:prstGeom prst="rect">
+            <a:avLst/>
+          </a:prstGeom>
+        </p:spPr>
+      </p:pic>
+    </p:spTree>
+    <p:extLst>
+      <p:ext uri="{BB962C8B-B14F-4D97-AF65-F5344CB8AC3E}">
+        <p14:creationId xmlns:p14="http://schemas.microsoft.com/office/powerpoint/2010/main" val="930073395"/>
+      </p:ext>
+    </p:extLst>
+  </p:cSld>
+  <p:clrMapOvr>
+    <a:masterClrMapping/>
+  </p:clrMapOvr>
+</p:sld>
+</file>
+
+<file path=ppt/slides/slide11.xml><?xml version="1.0" encoding="utf-8"?>
+<p:sld xmlns:a="http://schemas.openxmlformats.org/drawingml/2006/main" xmlns:r="http://schemas.openxmlformats.org/officeDocument/2006/relationships" xmlns:p="http://schemas.openxmlformats.org/presentationml/2006/main">
+  <p:cSld>
+    <p:spTree>
+      <p:nvGrpSpPr>
         <p:cNvPr id="1" name="">
           <a:extLst>
             <a:ext uri="{FF2B5EF4-FFF2-40B4-BE49-F238E27FC236}">
@@ -7686,7 +7853,7 @@
             <a:fld id="{B67B645E-C5E5-4727-B977-D372A0AA71D9}" type="slidenum">
               <a:rPr lang="en-US" smtClean="0"/>
               <a:pPr/>
-              <a:t>10</a:t>
+              <a:t>11</a:t>
             </a:fld>
             <a:endParaRPr lang="en-US" dirty="0"/>
           </a:p>
@@ -7696,136 +7863,6 @@
     <p:extLst>
       <p:ext uri="{BB962C8B-B14F-4D97-AF65-F5344CB8AC3E}">
         <p14:creationId xmlns:p14="http://schemas.microsoft.com/office/powerpoint/2010/main" val="1168979661"/>
-      </p:ext>
-    </p:extLst>
-  </p:cSld>
-  <p:clrMapOvr>
-    <a:masterClrMapping/>
-  </p:clrMapOvr>
-</p:sld>
-</file>
-
-<file path=ppt/slides/slide11.xml><?xml version="1.0" encoding="utf-8"?>
-<p:sld xmlns:a="http://schemas.openxmlformats.org/drawingml/2006/main" xmlns:r="http://schemas.openxmlformats.org/officeDocument/2006/relationships" xmlns:p="http://schemas.openxmlformats.org/presentationml/2006/main">
-  <p:cSld>
-    <p:spTree>
-      <p:nvGrpSpPr>
-        <p:cNvPr id="1" name=""/>
-        <p:cNvGrpSpPr/>
-        <p:nvPr/>
-      </p:nvGrpSpPr>
-      <p:grpSpPr>
-        <a:xfrm>
-          <a:off x="0" y="0"/>
-          <a:ext cx="0" cy="0"/>
-          <a:chOff x="0" y="0"/>
-          <a:chExt cx="0" cy="0"/>
-        </a:xfrm>
-      </p:grpSpPr>
-      <p:sp>
-        <p:nvSpPr>
-          <p:cNvPr id="2" name="Title 1">
-            <a:extLst>
-              <a:ext uri="{FF2B5EF4-FFF2-40B4-BE49-F238E27FC236}">
-                <a16:creationId xmlns:a16="http://schemas.microsoft.com/office/drawing/2014/main" id="{A77F160B-AF27-B7B9-795A-6950EC477D75}"/>
-              </a:ext>
-            </a:extLst>
-          </p:cNvPr>
-          <p:cNvSpPr>
-            <a:spLocks noGrp="1"/>
-          </p:cNvSpPr>
-          <p:nvPr>
-            <p:ph type="title"/>
-          </p:nvPr>
-        </p:nvSpPr>
-        <p:spPr/>
-        <p:txBody>
-          <a:bodyPr/>
-          <a:lstStyle/>
-          <a:p>
-            <a:r>
-              <a:rPr lang="en-US" dirty="0"/>
-              <a:t>Challenges so far</a:t>
-            </a:r>
-          </a:p>
-        </p:txBody>
-      </p:sp>
-      <p:sp>
-        <p:nvSpPr>
-          <p:cNvPr id="3" name="Content Placeholder 2">
-            <a:extLst>
-              <a:ext uri="{FF2B5EF4-FFF2-40B4-BE49-F238E27FC236}">
-                <a16:creationId xmlns:a16="http://schemas.microsoft.com/office/drawing/2014/main" id="{D51F76C4-2D7C-3DF9-F61F-30FCC2A901ED}"/>
-              </a:ext>
-            </a:extLst>
-          </p:cNvPr>
-          <p:cNvSpPr>
-            <a:spLocks noGrp="1"/>
-          </p:cNvSpPr>
-          <p:nvPr>
-            <p:ph sz="quarter" idx="13"/>
-          </p:nvPr>
-        </p:nvSpPr>
-        <p:spPr>
-          <a:xfrm>
-            <a:off x="841248" y="1536827"/>
-            <a:ext cx="10076688" cy="4479925"/>
-          </a:xfrm>
-        </p:spPr>
-        <p:txBody>
-          <a:bodyPr/>
-          <a:lstStyle/>
-          <a:p>
-            <a:r>
-              <a:rPr lang="en-US" dirty="0"/>
-              <a:t>Determining where to isolate from</a:t>
-            </a:r>
-          </a:p>
-          <a:p>
-            <a:r>
-              <a:rPr lang="en-US" dirty="0"/>
-              <a:t>Finding MCU with Bluetooth capabilities</a:t>
-            </a:r>
-          </a:p>
-          <a:p>
-            <a:endParaRPr lang="en-US" dirty="0"/>
-          </a:p>
-        </p:txBody>
-      </p:sp>
-      <p:sp>
-        <p:nvSpPr>
-          <p:cNvPr id="4" name="Slide Number Placeholder 3">
-            <a:extLst>
-              <a:ext uri="{FF2B5EF4-FFF2-40B4-BE49-F238E27FC236}">
-                <a16:creationId xmlns:a16="http://schemas.microsoft.com/office/drawing/2014/main" id="{8DC54A4F-408F-2AE8-E17D-8D70EF316CD6}"/>
-              </a:ext>
-            </a:extLst>
-          </p:cNvPr>
-          <p:cNvSpPr>
-            <a:spLocks noGrp="1"/>
-          </p:cNvSpPr>
-          <p:nvPr>
-            <p:ph type="sldNum" sz="quarter" idx="11"/>
-          </p:nvPr>
-        </p:nvSpPr>
-        <p:spPr/>
-        <p:txBody>
-          <a:bodyPr/>
-          <a:lstStyle/>
-          <a:p>
-            <a:fld id="{B67B645E-C5E5-4727-B977-D372A0AA71D9}" type="slidenum">
-              <a:rPr lang="en-US" smtClean="0"/>
-              <a:pPr/>
-              <a:t>11</a:t>
-            </a:fld>
-            <a:endParaRPr lang="en-US" dirty="0"/>
-          </a:p>
-        </p:txBody>
-      </p:sp>
-    </p:spTree>
-    <p:extLst>
-      <p:ext uri="{BB962C8B-B14F-4D97-AF65-F5344CB8AC3E}">
-        <p14:creationId xmlns:p14="http://schemas.microsoft.com/office/powerpoint/2010/main" val="1809417748"/>
       </p:ext>
     </p:extLst>
   </p:cSld>
@@ -7857,7 +7894,7 @@
           <p:cNvPr id="2" name="Title 1">
             <a:extLst>
               <a:ext uri="{FF2B5EF4-FFF2-40B4-BE49-F238E27FC236}">
-                <a16:creationId xmlns:a16="http://schemas.microsoft.com/office/drawing/2014/main" id="{E178EF87-E3BB-A226-DCCF-2D45CE9BE47B}"/>
+                <a16:creationId xmlns:a16="http://schemas.microsoft.com/office/drawing/2014/main" id="{A77F160B-AF27-B7B9-795A-6950EC477D75}"/>
               </a:ext>
             </a:extLst>
           </p:cNvPr>
@@ -7875,7 +7912,7 @@
           <a:p>
             <a:r>
               <a:rPr lang="en-US" dirty="0"/>
-              <a:t>Immediate Plan</a:t>
+              <a:t>Challenges so far</a:t>
             </a:r>
           </a:p>
         </p:txBody>
@@ -7885,7 +7922,7 @@
           <p:cNvPr id="3" name="Content Placeholder 2">
             <a:extLst>
               <a:ext uri="{FF2B5EF4-FFF2-40B4-BE49-F238E27FC236}">
-                <a16:creationId xmlns:a16="http://schemas.microsoft.com/office/drawing/2014/main" id="{1F4E9115-94A4-A2F8-8B11-947907F62B45}"/>
+                <a16:creationId xmlns:a16="http://schemas.microsoft.com/office/drawing/2014/main" id="{D51F76C4-2D7C-3DF9-F61F-30FCC2A901ED}"/>
               </a:ext>
             </a:extLst>
           </p:cNvPr>
@@ -7899,7 +7936,7 @@
         <p:spPr>
           <a:xfrm>
             <a:off x="841248" y="1536827"/>
-            <a:ext cx="10479024" cy="4479925"/>
+            <a:ext cx="10076688" cy="4479925"/>
           </a:xfrm>
         </p:spPr>
         <p:txBody>
@@ -7908,26 +7945,17 @@
           <a:p>
             <a:r>
               <a:rPr lang="en-US" dirty="0"/>
-              <a:t>Continue schematic and symbol creation</a:t>
+              <a:t>Determining where to isolate from</a:t>
             </a:r>
           </a:p>
           <a:p>
             <a:r>
               <a:rPr lang="en-US" dirty="0"/>
-              <a:t>Find battery for device</a:t>
-            </a:r>
-          </a:p>
-          <a:p>
-            <a:r>
-              <a:rPr lang="en-US" dirty="0"/>
-              <a:t>Find components for Jim Williams source that handle high voltage and simulate</a:t>
-            </a:r>
-          </a:p>
-          <a:p>
-            <a:r>
-              <a:rPr lang="en-US" dirty="0"/>
-              <a:t>Determine board measurements for housing</a:t>
-            </a:r>
+              <a:t>Finding MCU with Bluetooth capabilities</a:t>
+            </a:r>
+          </a:p>
+          <a:p>
+            <a:endParaRPr lang="en-US" dirty="0"/>
           </a:p>
         </p:txBody>
       </p:sp>
@@ -7936,7 +7964,7 @@
           <p:cNvPr id="4" name="Slide Number Placeholder 3">
             <a:extLst>
               <a:ext uri="{FF2B5EF4-FFF2-40B4-BE49-F238E27FC236}">
-                <a16:creationId xmlns:a16="http://schemas.microsoft.com/office/drawing/2014/main" id="{305C2303-290B-35FB-A4CD-104764401AD5}"/>
+                <a16:creationId xmlns:a16="http://schemas.microsoft.com/office/drawing/2014/main" id="{8DC54A4F-408F-2AE8-E17D-8D70EF316CD6}"/>
               </a:ext>
             </a:extLst>
           </p:cNvPr>
@@ -7956,6 +7984,145 @@
               <a:rPr lang="en-US" smtClean="0"/>
               <a:pPr/>
               <a:t>12</a:t>
+            </a:fld>
+            <a:endParaRPr lang="en-US" dirty="0"/>
+          </a:p>
+        </p:txBody>
+      </p:sp>
+    </p:spTree>
+    <p:extLst>
+      <p:ext uri="{BB962C8B-B14F-4D97-AF65-F5344CB8AC3E}">
+        <p14:creationId xmlns:p14="http://schemas.microsoft.com/office/powerpoint/2010/main" val="1809417748"/>
+      </p:ext>
+    </p:extLst>
+  </p:cSld>
+  <p:clrMapOvr>
+    <a:masterClrMapping/>
+  </p:clrMapOvr>
+</p:sld>
+</file>
+
+<file path=ppt/slides/slide13.xml><?xml version="1.0" encoding="utf-8"?>
+<p:sld xmlns:a="http://schemas.openxmlformats.org/drawingml/2006/main" xmlns:r="http://schemas.openxmlformats.org/officeDocument/2006/relationships" xmlns:p="http://schemas.openxmlformats.org/presentationml/2006/main">
+  <p:cSld>
+    <p:spTree>
+      <p:nvGrpSpPr>
+        <p:cNvPr id="1" name=""/>
+        <p:cNvGrpSpPr/>
+        <p:nvPr/>
+      </p:nvGrpSpPr>
+      <p:grpSpPr>
+        <a:xfrm>
+          <a:off x="0" y="0"/>
+          <a:ext cx="0" cy="0"/>
+          <a:chOff x="0" y="0"/>
+          <a:chExt cx="0" cy="0"/>
+        </a:xfrm>
+      </p:grpSpPr>
+      <p:sp>
+        <p:nvSpPr>
+          <p:cNvPr id="2" name="Title 1">
+            <a:extLst>
+              <a:ext uri="{FF2B5EF4-FFF2-40B4-BE49-F238E27FC236}">
+                <a16:creationId xmlns:a16="http://schemas.microsoft.com/office/drawing/2014/main" id="{E178EF87-E3BB-A226-DCCF-2D45CE9BE47B}"/>
+              </a:ext>
+            </a:extLst>
+          </p:cNvPr>
+          <p:cNvSpPr>
+            <a:spLocks noGrp="1"/>
+          </p:cNvSpPr>
+          <p:nvPr>
+            <p:ph type="title"/>
+          </p:nvPr>
+        </p:nvSpPr>
+        <p:spPr/>
+        <p:txBody>
+          <a:bodyPr/>
+          <a:lstStyle/>
+          <a:p>
+            <a:r>
+              <a:rPr lang="en-US" dirty="0"/>
+              <a:t>Immediate Plan</a:t>
+            </a:r>
+          </a:p>
+        </p:txBody>
+      </p:sp>
+      <p:sp>
+        <p:nvSpPr>
+          <p:cNvPr id="3" name="Content Placeholder 2">
+            <a:extLst>
+              <a:ext uri="{FF2B5EF4-FFF2-40B4-BE49-F238E27FC236}">
+                <a16:creationId xmlns:a16="http://schemas.microsoft.com/office/drawing/2014/main" id="{1F4E9115-94A4-A2F8-8B11-947907F62B45}"/>
+              </a:ext>
+            </a:extLst>
+          </p:cNvPr>
+          <p:cNvSpPr>
+            <a:spLocks noGrp="1"/>
+          </p:cNvSpPr>
+          <p:nvPr>
+            <p:ph sz="quarter" idx="13"/>
+          </p:nvPr>
+        </p:nvSpPr>
+        <p:spPr>
+          <a:xfrm>
+            <a:off x="841248" y="1536827"/>
+            <a:ext cx="10479024" cy="4479925"/>
+          </a:xfrm>
+        </p:spPr>
+        <p:txBody>
+          <a:bodyPr/>
+          <a:lstStyle/>
+          <a:p>
+            <a:r>
+              <a:rPr lang="en-US" dirty="0"/>
+              <a:t>Continue schematic and symbol creation</a:t>
+            </a:r>
+          </a:p>
+          <a:p>
+            <a:r>
+              <a:rPr lang="en-US" dirty="0"/>
+              <a:t>Find battery for device</a:t>
+            </a:r>
+          </a:p>
+          <a:p>
+            <a:r>
+              <a:rPr lang="en-US" dirty="0"/>
+              <a:t>Find components for Jim Williams source that handle high voltage and simulate</a:t>
+            </a:r>
+          </a:p>
+          <a:p>
+            <a:r>
+              <a:rPr lang="en-US" dirty="0"/>
+              <a:t>Determine board measurements for housing</a:t>
+            </a:r>
+          </a:p>
+        </p:txBody>
+      </p:sp>
+      <p:sp>
+        <p:nvSpPr>
+          <p:cNvPr id="4" name="Slide Number Placeholder 3">
+            <a:extLst>
+              <a:ext uri="{FF2B5EF4-FFF2-40B4-BE49-F238E27FC236}">
+                <a16:creationId xmlns:a16="http://schemas.microsoft.com/office/drawing/2014/main" id="{305C2303-290B-35FB-A4CD-104764401AD5}"/>
+              </a:ext>
+            </a:extLst>
+          </p:cNvPr>
+          <p:cNvSpPr>
+            <a:spLocks noGrp="1"/>
+          </p:cNvSpPr>
+          <p:nvPr>
+            <p:ph type="sldNum" sz="quarter" idx="11"/>
+          </p:nvPr>
+        </p:nvSpPr>
+        <p:spPr/>
+        <p:txBody>
+          <a:bodyPr/>
+          <a:lstStyle/>
+          <a:p>
+            <a:fld id="{B67B645E-C5E5-4727-B977-D372A0AA71D9}" type="slidenum">
+              <a:rPr lang="en-US" smtClean="0"/>
+              <a:pPr/>
+              <a:t>13</a:t>
             </a:fld>
             <a:endParaRPr lang="en-US" dirty="0"/>
           </a:p>
@@ -7974,7 +8141,7 @@
 </p:sld>
 </file>
 
-<file path=ppt/slides/slide13.xml><?xml version="1.0" encoding="utf-8"?>
+<file path=ppt/slides/slide14.xml><?xml version="1.0" encoding="utf-8"?>
 <p:sld xmlns:a="http://schemas.openxmlformats.org/drawingml/2006/main" xmlns:r="http://schemas.openxmlformats.org/officeDocument/2006/relationships" xmlns:p="http://schemas.openxmlformats.org/presentationml/2006/main">
   <p:cSld>
     <p:spTree>
@@ -8547,6 +8714,237 @@
   <p:cSld>
     <p:spTree>
       <p:nvGrpSpPr>
+        <p:cNvPr id="1" name=""/>
+        <p:cNvGrpSpPr/>
+        <p:nvPr/>
+      </p:nvGrpSpPr>
+      <p:grpSpPr>
+        <a:xfrm>
+          <a:off x="0" y="0"/>
+          <a:ext cx="0" cy="0"/>
+          <a:chOff x="0" y="0"/>
+          <a:chExt cx="0" cy="0"/>
+        </a:xfrm>
+      </p:grpSpPr>
+      <p:sp>
+        <p:nvSpPr>
+          <p:cNvPr id="2" name="Title 1">
+            <a:extLst>
+              <a:ext uri="{FF2B5EF4-FFF2-40B4-BE49-F238E27FC236}">
+                <a16:creationId xmlns:a16="http://schemas.microsoft.com/office/drawing/2014/main" id="{5641EF84-7800-B9C7-9E33-4410AE59D74D}"/>
+              </a:ext>
+            </a:extLst>
+          </p:cNvPr>
+          <p:cNvSpPr>
+            <a:spLocks noGrp="1"/>
+          </p:cNvSpPr>
+          <p:nvPr>
+            <p:ph type="title"/>
+          </p:nvPr>
+        </p:nvSpPr>
+        <p:spPr>
+          <a:xfrm>
+            <a:off x="722376" y="841248"/>
+            <a:ext cx="10597896" cy="393192"/>
+          </a:xfrm>
+        </p:spPr>
+        <p:txBody>
+          <a:bodyPr/>
+          <a:lstStyle/>
+          <a:p>
+            <a:r>
+              <a:rPr lang="en-US" dirty="0"/>
+              <a:t>Working Current Source</a:t>
+            </a:r>
+          </a:p>
+        </p:txBody>
+      </p:sp>
+      <p:pic>
+        <p:nvPicPr>
+          <p:cNvPr id="6" name="Content Placeholder 5" descr="A diagram of a circuit&#10;&#10;AI-generated content may be incorrect.">
+            <a:extLst>
+              <a:ext uri="{FF2B5EF4-FFF2-40B4-BE49-F238E27FC236}">
+                <a16:creationId xmlns:a16="http://schemas.microsoft.com/office/drawing/2014/main" id="{B6D03DAA-0EAC-2A18-5AF8-D18C3DAFE439}"/>
+              </a:ext>
+            </a:extLst>
+          </p:cNvPr>
+          <p:cNvPicPr>
+            <a:picLocks noGrp="1" noChangeAspect="1"/>
+          </p:cNvPicPr>
+          <p:nvPr>
+            <p:ph sz="quarter" idx="13"/>
+          </p:nvPr>
+        </p:nvPicPr>
+        <p:blipFill>
+          <a:blip r:embed="rId2"/>
+          <a:stretch>
+            <a:fillRect/>
+          </a:stretch>
+        </p:blipFill>
+        <p:spPr>
+          <a:xfrm>
+            <a:off x="113981" y="2560320"/>
+            <a:ext cx="5521646" cy="3300984"/>
+          </a:xfrm>
+        </p:spPr>
+      </p:pic>
+      <p:sp>
+        <p:nvSpPr>
+          <p:cNvPr id="4" name="Slide Number Placeholder 3">
+            <a:extLst>
+              <a:ext uri="{FF2B5EF4-FFF2-40B4-BE49-F238E27FC236}">
+                <a16:creationId xmlns:a16="http://schemas.microsoft.com/office/drawing/2014/main" id="{0E1E543C-961F-7D47-CAD1-963095A3A178}"/>
+              </a:ext>
+            </a:extLst>
+          </p:cNvPr>
+          <p:cNvSpPr>
+            <a:spLocks noGrp="1"/>
+          </p:cNvSpPr>
+          <p:nvPr>
+            <p:ph type="sldNum" sz="quarter" idx="11"/>
+          </p:nvPr>
+        </p:nvSpPr>
+        <p:spPr/>
+        <p:txBody>
+          <a:bodyPr/>
+          <a:lstStyle/>
+          <a:p>
+            <a:fld id="{B67B645E-C5E5-4727-B977-D372A0AA71D9}" type="slidenum">
+              <a:rPr lang="en-US" smtClean="0"/>
+              <a:pPr/>
+              <a:t>5</a:t>
+            </a:fld>
+            <a:endParaRPr lang="en-US" dirty="0"/>
+          </a:p>
+        </p:txBody>
+      </p:sp>
+      <p:pic>
+        <p:nvPicPr>
+          <p:cNvPr id="8" name="Picture 7" descr="A screen shot of a computer&#10;&#10;AI-generated content may be incorrect.">
+            <a:extLst>
+              <a:ext uri="{FF2B5EF4-FFF2-40B4-BE49-F238E27FC236}">
+                <a16:creationId xmlns:a16="http://schemas.microsoft.com/office/drawing/2014/main" id="{311BB85A-32AF-E273-D31B-D8252397F777}"/>
+              </a:ext>
+            </a:extLst>
+          </p:cNvPr>
+          <p:cNvPicPr>
+            <a:picLocks noChangeAspect="1"/>
+          </p:cNvPicPr>
+          <p:nvPr/>
+        </p:nvPicPr>
+        <p:blipFill>
+          <a:blip r:embed="rId3"/>
+          <a:stretch>
+            <a:fillRect/>
+          </a:stretch>
+        </p:blipFill>
+        <p:spPr>
+          <a:xfrm>
+            <a:off x="5635627" y="2560320"/>
+            <a:ext cx="6480210" cy="3300984"/>
+          </a:xfrm>
+          <a:prstGeom prst="rect">
+            <a:avLst/>
+          </a:prstGeom>
+        </p:spPr>
+      </p:pic>
+      <p:sp>
+        <p:nvSpPr>
+          <p:cNvPr id="9" name="TextBox 8">
+            <a:extLst>
+              <a:ext uri="{FF2B5EF4-FFF2-40B4-BE49-F238E27FC236}">
+                <a16:creationId xmlns:a16="http://schemas.microsoft.com/office/drawing/2014/main" id="{746B6A44-0217-AF25-5723-D3A7836708CA}"/>
+              </a:ext>
+            </a:extLst>
+          </p:cNvPr>
+          <p:cNvSpPr txBox="1"/>
+          <p:nvPr/>
+        </p:nvSpPr>
+        <p:spPr>
+          <a:xfrm>
+            <a:off x="630936" y="1574214"/>
+            <a:ext cx="5281959" cy="646331"/>
+          </a:xfrm>
+          <a:prstGeom prst="rect">
+            <a:avLst/>
+          </a:prstGeom>
+          <a:noFill/>
+        </p:spPr>
+        <p:txBody>
+          <a:bodyPr wrap="none" rtlCol="0">
+            <a:spAutoFit/>
+          </a:bodyPr>
+          <a:lstStyle/>
+          <a:p>
+            <a:pPr marL="285750" indent="-285750">
+              <a:buFont typeface="Arial" panose="020B0604020202020204" pitchFamily="34" charset="0"/>
+              <a:buChar char="•"/>
+            </a:pPr>
+            <a:r>
+              <a:rPr lang="en-US" dirty="0"/>
+              <a:t>Need to figure out better op amps for higher load</a:t>
+            </a:r>
+          </a:p>
+          <a:p>
+            <a:pPr marL="285750" indent="-285750">
+              <a:buFont typeface="Arial" panose="020B0604020202020204" pitchFamily="34" charset="0"/>
+              <a:buChar char="•"/>
+            </a:pPr>
+            <a:r>
+              <a:rPr lang="en-US" dirty="0"/>
+              <a:t>Max load resistance right now is around 725Ohms</a:t>
+            </a:r>
+          </a:p>
+        </p:txBody>
+      </p:sp>
+      <p:pic>
+        <p:nvPicPr>
+          <p:cNvPr id="10" name="Picture 9" descr="A diagram of a circuit&#10;&#10;AI-generated content may be incorrect.">
+            <a:extLst>
+              <a:ext uri="{FF2B5EF4-FFF2-40B4-BE49-F238E27FC236}">
+                <a16:creationId xmlns:a16="http://schemas.microsoft.com/office/drawing/2014/main" id="{85A45EAE-082D-DD50-57F2-A2E4E50A20E2}"/>
+              </a:ext>
+            </a:extLst>
+          </p:cNvPr>
+          <p:cNvPicPr>
+            <a:picLocks noChangeAspect="1"/>
+          </p:cNvPicPr>
+          <p:nvPr/>
+        </p:nvPicPr>
+        <p:blipFill>
+          <a:blip r:embed="rId4"/>
+          <a:stretch>
+            <a:fillRect/>
+          </a:stretch>
+        </p:blipFill>
+        <p:spPr>
+          <a:xfrm>
+            <a:off x="8152292" y="271383"/>
+            <a:ext cx="3167980" cy="2119049"/>
+          </a:xfrm>
+          <a:prstGeom prst="rect">
+            <a:avLst/>
+          </a:prstGeom>
+        </p:spPr>
+      </p:pic>
+    </p:spTree>
+    <p:extLst>
+      <p:ext uri="{BB962C8B-B14F-4D97-AF65-F5344CB8AC3E}">
+        <p14:creationId xmlns:p14="http://schemas.microsoft.com/office/powerpoint/2010/main" val="1285182294"/>
+      </p:ext>
+    </p:extLst>
+  </p:cSld>
+  <p:clrMapOvr>
+    <a:masterClrMapping/>
+  </p:clrMapOvr>
+</p:sld>
+</file>
+
+<file path=ppt/slides/slide6.xml><?xml version="1.0" encoding="utf-8"?>
+<p:sld xmlns:a="http://schemas.openxmlformats.org/drawingml/2006/main" xmlns:r="http://schemas.openxmlformats.org/officeDocument/2006/relationships" xmlns:p="http://schemas.openxmlformats.org/presentationml/2006/main">
+  <p:cSld>
+    <p:spTree>
+      <p:nvGrpSpPr>
         <p:cNvPr id="1" name="">
           <a:extLst>
             <a:ext uri="{FF2B5EF4-FFF2-40B4-BE49-F238E27FC236}">
@@ -8617,7 +9015,7 @@
             <a:fld id="{B67B645E-C5E5-4727-B977-D372A0AA71D9}" type="slidenum">
               <a:rPr lang="en-US" smtClean="0"/>
               <a:pPr/>
-              <a:t>5</a:t>
+              <a:t>6</a:t>
             </a:fld>
             <a:endParaRPr lang="en-US" dirty="0"/>
           </a:p>
@@ -8696,7 +9094,7 @@
 </p:sld>
 </file>
 
-<file path=ppt/slides/slide6.xml><?xml version="1.0" encoding="utf-8"?>
+<file path=ppt/slides/slide7.xml><?xml version="1.0" encoding="utf-8"?>
 <p:sld xmlns:a="http://schemas.openxmlformats.org/drawingml/2006/main" xmlns:r="http://schemas.openxmlformats.org/officeDocument/2006/relationships" xmlns:p="http://schemas.openxmlformats.org/presentationml/2006/main">
   <p:cSld>
     <p:spTree>
@@ -8771,7 +9169,7 @@
             <a:fld id="{B67B645E-C5E5-4727-B977-D372A0AA71D9}" type="slidenum">
               <a:rPr lang="en-US" smtClean="0"/>
               <a:pPr/>
-              <a:t>6</a:t>
+              <a:t>7</a:t>
             </a:fld>
             <a:endParaRPr lang="en-US" dirty="0"/>
           </a:p>
@@ -8820,7 +9218,7 @@
 </p:sld>
 </file>
 
-<file path=ppt/slides/slide7.xml><?xml version="1.0" encoding="utf-8"?>
+<file path=ppt/slides/slide8.xml><?xml version="1.0" encoding="utf-8"?>
 <p:sld xmlns:a="http://schemas.openxmlformats.org/drawingml/2006/main" xmlns:r="http://schemas.openxmlformats.org/officeDocument/2006/relationships" xmlns:p="http://schemas.openxmlformats.org/presentationml/2006/main">
   <p:cSld>
     <p:spTree>
@@ -8928,7 +9326,7 @@
             <a:fld id="{B67B645E-C5E5-4727-B977-D372A0AA71D9}" type="slidenum">
               <a:rPr lang="en-US" smtClean="0"/>
               <a:pPr/>
-              <a:t>7</a:t>
+              <a:t>8</a:t>
             </a:fld>
             <a:endParaRPr lang="en-US" dirty="0"/>
           </a:p>
@@ -8977,7 +9375,7 @@
 </p:sld>
 </file>
 
-<file path=ppt/slides/slide8.xml><?xml version="1.0" encoding="utf-8"?>
+<file path=ppt/slides/slide9.xml><?xml version="1.0" encoding="utf-8"?>
 <p:sld xmlns:a="http://schemas.openxmlformats.org/drawingml/2006/main" xmlns:r="http://schemas.openxmlformats.org/officeDocument/2006/relationships" xmlns:p="http://schemas.openxmlformats.org/presentationml/2006/main">
   <p:cSld>
     <p:spTree>
@@ -9100,7 +9498,7 @@
             <a:fld id="{B67B645E-C5E5-4727-B977-D372A0AA71D9}" type="slidenum">
               <a:rPr lang="en-US" smtClean="0"/>
               <a:pPr/>
-              <a:t>8</a:t>
+              <a:t>9</a:t>
             </a:fld>
             <a:endParaRPr lang="en-US" dirty="0"/>
           </a:p>
@@ -9110,172 +9508,6 @@
     <p:extLst>
       <p:ext uri="{BB962C8B-B14F-4D97-AF65-F5344CB8AC3E}">
         <p14:creationId xmlns:p14="http://schemas.microsoft.com/office/powerpoint/2010/main" val="3022469066"/>
-      </p:ext>
-    </p:extLst>
-  </p:cSld>
-  <p:clrMapOvr>
-    <a:masterClrMapping/>
-  </p:clrMapOvr>
-</p:sld>
-</file>
-
-<file path=ppt/slides/slide9.xml><?xml version="1.0" encoding="utf-8"?>
-<p:sld xmlns:a="http://schemas.openxmlformats.org/drawingml/2006/main" xmlns:r="http://schemas.openxmlformats.org/officeDocument/2006/relationships" xmlns:p="http://schemas.openxmlformats.org/presentationml/2006/main">
-  <p:cSld>
-    <p:spTree>
-      <p:nvGrpSpPr>
-        <p:cNvPr id="1" name=""/>
-        <p:cNvGrpSpPr/>
-        <p:nvPr/>
-      </p:nvGrpSpPr>
-      <p:grpSpPr>
-        <a:xfrm>
-          <a:off x="0" y="0"/>
-          <a:ext cx="0" cy="0"/>
-          <a:chOff x="0" y="0"/>
-          <a:chExt cx="0" cy="0"/>
-        </a:xfrm>
-      </p:grpSpPr>
-      <p:sp>
-        <p:nvSpPr>
-          <p:cNvPr id="2" name="Title 1">
-            <a:extLst>
-              <a:ext uri="{FF2B5EF4-FFF2-40B4-BE49-F238E27FC236}">
-                <a16:creationId xmlns:a16="http://schemas.microsoft.com/office/drawing/2014/main" id="{F6960943-4213-471A-FB97-453EB2D92AD7}"/>
-              </a:ext>
-            </a:extLst>
-          </p:cNvPr>
-          <p:cNvSpPr>
-            <a:spLocks noGrp="1"/>
-          </p:cNvSpPr>
-          <p:nvPr>
-            <p:ph type="title"/>
-          </p:nvPr>
-        </p:nvSpPr>
-        <p:spPr/>
-        <p:txBody>
-          <a:bodyPr/>
-          <a:lstStyle/>
-          <a:p>
-            <a:r>
-              <a:rPr lang="en-US" dirty="0"/>
-              <a:t>High Voltage Rails</a:t>
-            </a:r>
-          </a:p>
-        </p:txBody>
-      </p:sp>
-      <p:sp>
-        <p:nvSpPr>
-          <p:cNvPr id="3" name="Content Placeholder 2">
-            <a:extLst>
-              <a:ext uri="{FF2B5EF4-FFF2-40B4-BE49-F238E27FC236}">
-                <a16:creationId xmlns:a16="http://schemas.microsoft.com/office/drawing/2014/main" id="{371E44E7-A863-F60C-AE9E-E991F455CA67}"/>
-              </a:ext>
-            </a:extLst>
-          </p:cNvPr>
-          <p:cNvSpPr>
-            <a:spLocks noGrp="1"/>
-          </p:cNvSpPr>
-          <p:nvPr>
-            <p:ph sz="quarter" idx="13"/>
-          </p:nvPr>
-        </p:nvSpPr>
-        <p:spPr>
-          <a:xfrm>
-            <a:off x="841248" y="1536827"/>
-            <a:ext cx="10533486" cy="4479925"/>
-          </a:xfrm>
-        </p:spPr>
-        <p:txBody>
-          <a:bodyPr/>
-          <a:lstStyle/>
-          <a:p>
-            <a:pPr marL="0" indent="0">
-              <a:buNone/>
-            </a:pPr>
-            <a:r>
-              <a:rPr lang="en-US" dirty="0"/>
-              <a:t>Need to drive to +/-30V with room for improvement.</a:t>
-            </a:r>
-          </a:p>
-          <a:p>
-            <a:r>
-              <a:rPr lang="en-US" dirty="0"/>
-              <a:t>Use boost converter</a:t>
-            </a:r>
-          </a:p>
-          <a:p>
-            <a:r>
-              <a:rPr lang="en-US" dirty="0"/>
-              <a:t>How do we minimize footprint?</a:t>
-            </a:r>
-          </a:p>
-        </p:txBody>
-      </p:sp>
-      <p:sp>
-        <p:nvSpPr>
-          <p:cNvPr id="4" name="Slide Number Placeholder 3">
-            <a:extLst>
-              <a:ext uri="{FF2B5EF4-FFF2-40B4-BE49-F238E27FC236}">
-                <a16:creationId xmlns:a16="http://schemas.microsoft.com/office/drawing/2014/main" id="{98EEA432-2056-CD7E-D9E3-D8592227B3E9}"/>
-              </a:ext>
-            </a:extLst>
-          </p:cNvPr>
-          <p:cNvSpPr>
-            <a:spLocks noGrp="1"/>
-          </p:cNvSpPr>
-          <p:nvPr>
-            <p:ph type="sldNum" sz="quarter" idx="11"/>
-          </p:nvPr>
-        </p:nvSpPr>
-        <p:spPr/>
-        <p:txBody>
-          <a:bodyPr/>
-          <a:lstStyle/>
-          <a:p>
-            <a:fld id="{B67B645E-C5E5-4727-B977-D372A0AA71D9}" type="slidenum">
-              <a:rPr lang="en-US" smtClean="0"/>
-              <a:pPr/>
-              <a:t>9</a:t>
-            </a:fld>
-            <a:endParaRPr lang="en-US" dirty="0"/>
-          </a:p>
-        </p:txBody>
-      </p:sp>
-      <p:pic>
-        <p:nvPicPr>
-          <p:cNvPr id="6" name="Picture 5" descr="A close-up of a circuit board&#10;&#10;AI-generated content may be incorrect.">
-            <a:extLst>
-              <a:ext uri="{FF2B5EF4-FFF2-40B4-BE49-F238E27FC236}">
-                <a16:creationId xmlns:a16="http://schemas.microsoft.com/office/drawing/2014/main" id="{39F3B60F-EED7-8641-369F-334B1F013986}"/>
-              </a:ext>
-            </a:extLst>
-          </p:cNvPr>
-          <p:cNvPicPr>
-            <a:picLocks noChangeAspect="1"/>
-          </p:cNvPicPr>
-          <p:nvPr/>
-        </p:nvPicPr>
-        <p:blipFill>
-          <a:blip r:embed="rId2"/>
-          <a:stretch>
-            <a:fillRect/>
-          </a:stretch>
-        </p:blipFill>
-        <p:spPr>
-          <a:xfrm>
-            <a:off x="7480998" y="2661509"/>
-            <a:ext cx="3651997" cy="3612937"/>
-          </a:xfrm>
-          <a:prstGeom prst="rect">
-            <a:avLst/>
-          </a:prstGeom>
-        </p:spPr>
-      </p:pic>
-    </p:spTree>
-    <p:extLst>
-      <p:ext uri="{BB962C8B-B14F-4D97-AF65-F5344CB8AC3E}">
-        <p14:creationId xmlns:p14="http://schemas.microsoft.com/office/powerpoint/2010/main" val="930073395"/>
       </p:ext>
     </p:extLst>
   </p:cSld>
@@ -10137,6 +10369,26 @@
 </file>
 
 <file path=customXml/item1.xml><?xml version="1.0" encoding="utf-8"?>
+<p:properties xmlns:p="http://schemas.microsoft.com/office/2006/metadata/properties" xmlns:xsi="http://www.w3.org/2001/XMLSchema-instance" xmlns:pc="http://schemas.microsoft.com/office/infopath/2007/PartnerControls">
+  <documentManagement>
+    <MediaServiceKeyPoints xmlns="71af3243-3dd4-4a8d-8c0d-dd76da1f02a5" xsi:nil="true"/>
+    <_ip_UnifiedCompliancePolicyUIAction xmlns="http://schemas.microsoft.com/sharepoint/v3" xsi:nil="true"/>
+    <Image xmlns="71af3243-3dd4-4a8d-8c0d-dd76da1f02a5">
+      <Url xsi:nil="true"/>
+      <Description xsi:nil="true"/>
+    </Image>
+    <Status xmlns="71af3243-3dd4-4a8d-8c0d-dd76da1f02a5">Not started</Status>
+    <Background xmlns="71af3243-3dd4-4a8d-8c0d-dd76da1f02a5">false</Background>
+    <_ip_UnifiedCompliancePolicyProperties xmlns="http://schemas.microsoft.com/sharepoint/v3" xsi:nil="true"/>
+    <ImageTagsTaxHTField xmlns="71af3243-3dd4-4a8d-8c0d-dd76da1f02a5">
+      <Terms xmlns="http://schemas.microsoft.com/office/infopath/2007/PartnerControls"/>
+    </ImageTagsTaxHTField>
+    <TaxCatchAll xmlns="230e9df3-be65-4c73-a93b-d1236ebd677e" xsi:nil="true"/>
+  </documentManagement>
+</p:properties>
+</file>
+
+<file path=customXml/item2.xml><?xml version="1.0" encoding="utf-8"?>
 <ct:contentTypeSchema xmlns:ct="http://schemas.microsoft.com/office/2006/metadata/contentType" xmlns:ma="http://schemas.microsoft.com/office/2006/metadata/properties/metaAttributes" ct:_="" ma:_="" ma:contentTypeName="Document" ma:contentTypeID="0x01010079F111ED35F8CC479449609E8A0923A6" ma:contentTypeVersion="29" ma:contentTypeDescription="Create a new document." ma:contentTypeScope="" ma:versionID="6a914531ae0f23be31da2eba1f3b42a9">
   <xsd:schema xmlns:xsd="http://www.w3.org/2001/XMLSchema" xmlns:xs="http://www.w3.org/2001/XMLSchema" xmlns:p="http://schemas.microsoft.com/office/2006/metadata/properties" xmlns:ns1="http://schemas.microsoft.com/sharepoint/v3" xmlns:ns2="71af3243-3dd4-4a8d-8c0d-dd76da1f02a5" xmlns:ns3="16c05727-aa75-4e4a-9b5f-8a80a1165891" xmlns:ns4="230e9df3-be65-4c73-a93b-d1236ebd677e" targetNamespace="http://schemas.microsoft.com/office/2006/metadata/properties" ma:root="true" ma:fieldsID="ae00154c9e66547f022c4923f88826d6" ns1:_="" ns2:_="" ns3:_="" ns4:_="">
     <xsd:import namespace="http://schemas.microsoft.com/sharepoint/v3"/>
@@ -10448,26 +10700,6 @@
 </ct:contentTypeSchema>
 </file>
 
-<file path=customXml/item2.xml><?xml version="1.0" encoding="utf-8"?>
-<p:properties xmlns:p="http://schemas.microsoft.com/office/2006/metadata/properties" xmlns:xsi="http://www.w3.org/2001/XMLSchema-instance" xmlns:pc="http://schemas.microsoft.com/office/infopath/2007/PartnerControls">
-  <documentManagement>
-    <MediaServiceKeyPoints xmlns="71af3243-3dd4-4a8d-8c0d-dd76da1f02a5" xsi:nil="true"/>
-    <_ip_UnifiedCompliancePolicyUIAction xmlns="http://schemas.microsoft.com/sharepoint/v3" xsi:nil="true"/>
-    <Image xmlns="71af3243-3dd4-4a8d-8c0d-dd76da1f02a5">
-      <Url xsi:nil="true"/>
-      <Description xsi:nil="true"/>
-    </Image>
-    <Status xmlns="71af3243-3dd4-4a8d-8c0d-dd76da1f02a5">Not started</Status>
-    <Background xmlns="71af3243-3dd4-4a8d-8c0d-dd76da1f02a5">false</Background>
-    <_ip_UnifiedCompliancePolicyProperties xmlns="http://schemas.microsoft.com/sharepoint/v3" xsi:nil="true"/>
-    <ImageTagsTaxHTField xmlns="71af3243-3dd4-4a8d-8c0d-dd76da1f02a5">
-      <Terms xmlns="http://schemas.microsoft.com/office/infopath/2007/PartnerControls"/>
-    </ImageTagsTaxHTField>
-    <TaxCatchAll xmlns="230e9df3-be65-4c73-a93b-d1236ebd677e" xsi:nil="true"/>
-  </documentManagement>
-</p:properties>
-</file>
-
 <file path=customXml/item3.xml><?xml version="1.0" encoding="utf-8"?>
 <?mso-contentType ?>
 <FormTemplates xmlns="http://schemas.microsoft.com/sharepoint/v3/contenttype/forms">
@@ -10478,6 +10710,18 @@
 </file>
 
 <file path=customXml/itemProps1.xml><?xml version="1.0" encoding="utf-8"?>
+<ds:datastoreItem xmlns:ds="http://schemas.openxmlformats.org/officeDocument/2006/customXml" ds:itemID="{7B247F30-5811-40C0-99EC-CF53200590BE}">
+  <ds:schemaRefs>
+    <ds:schemaRef ds:uri="230e9df3-be65-4c73-a93b-d1236ebd677e"/>
+    <ds:schemaRef ds:uri="71af3243-3dd4-4a8d-8c0d-dd76da1f02a5"/>
+    <ds:schemaRef ds:uri="http://schemas.microsoft.com/office/2006/metadata/properties"/>
+    <ds:schemaRef ds:uri="http://schemas.microsoft.com/office/infopath/2007/PartnerControls"/>
+    <ds:schemaRef ds:uri="http://schemas.microsoft.com/sharepoint/v3"/>
+  </ds:schemaRefs>
+</ds:datastoreItem>
+</file>
+
+<file path=customXml/itemProps2.xml><?xml version="1.0" encoding="utf-8"?>
 <ds:datastoreItem xmlns:ds="http://schemas.openxmlformats.org/officeDocument/2006/customXml" ds:itemID="{A8837B91-4329-4308-94DA-BB811B5F3092}">
   <ds:schemaRefs>
     <ds:schemaRef ds:uri="http://schemas.microsoft.com/office/2006/metadata/contentType"/>
@@ -10498,18 +10742,6 @@
 </ds:datastoreItem>
 </file>
 
-<file path=customXml/itemProps2.xml><?xml version="1.0" encoding="utf-8"?>
-<ds:datastoreItem xmlns:ds="http://schemas.openxmlformats.org/officeDocument/2006/customXml" ds:itemID="{7B247F30-5811-40C0-99EC-CF53200590BE}">
-  <ds:schemaRefs>
-    <ds:schemaRef ds:uri="230e9df3-be65-4c73-a93b-d1236ebd677e"/>
-    <ds:schemaRef ds:uri="71af3243-3dd4-4a8d-8c0d-dd76da1f02a5"/>
-    <ds:schemaRef ds:uri="http://schemas.microsoft.com/office/2006/metadata/properties"/>
-    <ds:schemaRef ds:uri="http://schemas.microsoft.com/office/infopath/2007/PartnerControls"/>
-    <ds:schemaRef ds:uri="http://schemas.microsoft.com/sharepoint/v3"/>
-  </ds:schemaRefs>
-</ds:datastoreItem>
-</file>
-
 <file path=customXml/itemProps3.xml><?xml version="1.0" encoding="utf-8"?>
 <ds:datastoreItem xmlns:ds="http://schemas.openxmlformats.org/officeDocument/2006/customXml" ds:itemID="{55E72E99-0076-433E-AD3A-575A11FAB73D}">
   <ds:schemaRefs>

</xml_diff>

<commit_message>
Adding more to the schematics and libraries
</commit_message>
<xml_diff>
--- a/Presentations/Week_4_Presentation.pptx
+++ b/Presentations/Week_4_Presentation.pptx
@@ -10369,26 +10369,6 @@
 </file>
 
 <file path=customXml/item1.xml><?xml version="1.0" encoding="utf-8"?>
-<p:properties xmlns:p="http://schemas.microsoft.com/office/2006/metadata/properties" xmlns:xsi="http://www.w3.org/2001/XMLSchema-instance" xmlns:pc="http://schemas.microsoft.com/office/infopath/2007/PartnerControls">
-  <documentManagement>
-    <MediaServiceKeyPoints xmlns="71af3243-3dd4-4a8d-8c0d-dd76da1f02a5" xsi:nil="true"/>
-    <_ip_UnifiedCompliancePolicyUIAction xmlns="http://schemas.microsoft.com/sharepoint/v3" xsi:nil="true"/>
-    <Image xmlns="71af3243-3dd4-4a8d-8c0d-dd76da1f02a5">
-      <Url xsi:nil="true"/>
-      <Description xsi:nil="true"/>
-    </Image>
-    <Status xmlns="71af3243-3dd4-4a8d-8c0d-dd76da1f02a5">Not started</Status>
-    <Background xmlns="71af3243-3dd4-4a8d-8c0d-dd76da1f02a5">false</Background>
-    <_ip_UnifiedCompliancePolicyProperties xmlns="http://schemas.microsoft.com/sharepoint/v3" xsi:nil="true"/>
-    <ImageTagsTaxHTField xmlns="71af3243-3dd4-4a8d-8c0d-dd76da1f02a5">
-      <Terms xmlns="http://schemas.microsoft.com/office/infopath/2007/PartnerControls"/>
-    </ImageTagsTaxHTField>
-    <TaxCatchAll xmlns="230e9df3-be65-4c73-a93b-d1236ebd677e" xsi:nil="true"/>
-  </documentManagement>
-</p:properties>
-</file>
-
-<file path=customXml/item2.xml><?xml version="1.0" encoding="utf-8"?>
 <ct:contentTypeSchema xmlns:ct="http://schemas.microsoft.com/office/2006/metadata/contentType" xmlns:ma="http://schemas.microsoft.com/office/2006/metadata/properties/metaAttributes" ct:_="" ma:_="" ma:contentTypeName="Document" ma:contentTypeID="0x01010079F111ED35F8CC479449609E8A0923A6" ma:contentTypeVersion="29" ma:contentTypeDescription="Create a new document." ma:contentTypeScope="" ma:versionID="6a914531ae0f23be31da2eba1f3b42a9">
   <xsd:schema xmlns:xsd="http://www.w3.org/2001/XMLSchema" xmlns:xs="http://www.w3.org/2001/XMLSchema" xmlns:p="http://schemas.microsoft.com/office/2006/metadata/properties" xmlns:ns1="http://schemas.microsoft.com/sharepoint/v3" xmlns:ns2="71af3243-3dd4-4a8d-8c0d-dd76da1f02a5" xmlns:ns3="16c05727-aa75-4e4a-9b5f-8a80a1165891" xmlns:ns4="230e9df3-be65-4c73-a93b-d1236ebd677e" targetNamespace="http://schemas.microsoft.com/office/2006/metadata/properties" ma:root="true" ma:fieldsID="ae00154c9e66547f022c4923f88826d6" ns1:_="" ns2:_="" ns3:_="" ns4:_="">
     <xsd:import namespace="http://schemas.microsoft.com/sharepoint/v3"/>
@@ -10700,6 +10680,26 @@
 </ct:contentTypeSchema>
 </file>
 
+<file path=customXml/item2.xml><?xml version="1.0" encoding="utf-8"?>
+<p:properties xmlns:p="http://schemas.microsoft.com/office/2006/metadata/properties" xmlns:xsi="http://www.w3.org/2001/XMLSchema-instance" xmlns:pc="http://schemas.microsoft.com/office/infopath/2007/PartnerControls">
+  <documentManagement>
+    <MediaServiceKeyPoints xmlns="71af3243-3dd4-4a8d-8c0d-dd76da1f02a5" xsi:nil="true"/>
+    <_ip_UnifiedCompliancePolicyUIAction xmlns="http://schemas.microsoft.com/sharepoint/v3" xsi:nil="true"/>
+    <Image xmlns="71af3243-3dd4-4a8d-8c0d-dd76da1f02a5">
+      <Url xsi:nil="true"/>
+      <Description xsi:nil="true"/>
+    </Image>
+    <Status xmlns="71af3243-3dd4-4a8d-8c0d-dd76da1f02a5">Not started</Status>
+    <Background xmlns="71af3243-3dd4-4a8d-8c0d-dd76da1f02a5">false</Background>
+    <_ip_UnifiedCompliancePolicyProperties xmlns="http://schemas.microsoft.com/sharepoint/v3" xsi:nil="true"/>
+    <ImageTagsTaxHTField xmlns="71af3243-3dd4-4a8d-8c0d-dd76da1f02a5">
+      <Terms xmlns="http://schemas.microsoft.com/office/infopath/2007/PartnerControls"/>
+    </ImageTagsTaxHTField>
+    <TaxCatchAll xmlns="230e9df3-be65-4c73-a93b-d1236ebd677e" xsi:nil="true"/>
+  </documentManagement>
+</p:properties>
+</file>
+
 <file path=customXml/item3.xml><?xml version="1.0" encoding="utf-8"?>
 <?mso-contentType ?>
 <FormTemplates xmlns="http://schemas.microsoft.com/sharepoint/v3/contenttype/forms">
@@ -10710,18 +10710,6 @@
 </file>
 
 <file path=customXml/itemProps1.xml><?xml version="1.0" encoding="utf-8"?>
-<ds:datastoreItem xmlns:ds="http://schemas.openxmlformats.org/officeDocument/2006/customXml" ds:itemID="{7B247F30-5811-40C0-99EC-CF53200590BE}">
-  <ds:schemaRefs>
-    <ds:schemaRef ds:uri="230e9df3-be65-4c73-a93b-d1236ebd677e"/>
-    <ds:schemaRef ds:uri="71af3243-3dd4-4a8d-8c0d-dd76da1f02a5"/>
-    <ds:schemaRef ds:uri="http://schemas.microsoft.com/office/2006/metadata/properties"/>
-    <ds:schemaRef ds:uri="http://schemas.microsoft.com/office/infopath/2007/PartnerControls"/>
-    <ds:schemaRef ds:uri="http://schemas.microsoft.com/sharepoint/v3"/>
-  </ds:schemaRefs>
-</ds:datastoreItem>
-</file>
-
-<file path=customXml/itemProps2.xml><?xml version="1.0" encoding="utf-8"?>
 <ds:datastoreItem xmlns:ds="http://schemas.openxmlformats.org/officeDocument/2006/customXml" ds:itemID="{A8837B91-4329-4308-94DA-BB811B5F3092}">
   <ds:schemaRefs>
     <ds:schemaRef ds:uri="http://schemas.microsoft.com/office/2006/metadata/contentType"/>
@@ -10742,6 +10730,18 @@
 </ds:datastoreItem>
 </file>
 
+<file path=customXml/itemProps2.xml><?xml version="1.0" encoding="utf-8"?>
+<ds:datastoreItem xmlns:ds="http://schemas.openxmlformats.org/officeDocument/2006/customXml" ds:itemID="{7B247F30-5811-40C0-99EC-CF53200590BE}">
+  <ds:schemaRefs>
+    <ds:schemaRef ds:uri="230e9df3-be65-4c73-a93b-d1236ebd677e"/>
+    <ds:schemaRef ds:uri="71af3243-3dd4-4a8d-8c0d-dd76da1f02a5"/>
+    <ds:schemaRef ds:uri="http://schemas.microsoft.com/office/2006/metadata/properties"/>
+    <ds:schemaRef ds:uri="http://schemas.microsoft.com/office/infopath/2007/PartnerControls"/>
+    <ds:schemaRef ds:uri="http://schemas.microsoft.com/sharepoint/v3"/>
+  </ds:schemaRefs>
+</ds:datastoreItem>
+</file>
+
 <file path=customXml/itemProps3.xml><?xml version="1.0" encoding="utf-8"?>
 <ds:datastoreItem xmlns:ds="http://schemas.openxmlformats.org/officeDocument/2006/customXml" ds:itemID="{55E72E99-0076-433E-AD3A-575A11FAB73D}">
   <ds:schemaRefs>

</xml_diff>